<commit_message>
Final pptx for project.
</commit_message>
<xml_diff>
--- a/Sales_Management_Project.pptx
+++ b/Sales_Management_Project.pptx
@@ -1047,7 +1047,7 @@
               </a:spcAft>
               <a:buNone/>
             </a:pPr>
-            <a:endParaRPr/>
+            <a:endParaRPr dirty="0"/>
           </a:p>
         </p:txBody>
       </p:sp>
@@ -9135,8 +9135,8 @@
         </p:nvSpPr>
         <p:spPr>
           <a:xfrm>
-            <a:off x="246458" y="1835524"/>
-            <a:ext cx="8520600" cy="2938182"/>
+            <a:off x="246458" y="1625662"/>
+            <a:ext cx="8520600" cy="3283617"/>
           </a:xfrm>
           <a:prstGeom prst="rect">
             <a:avLst/>
@@ -9144,11 +9144,11 @@
         </p:spPr>
         <p:txBody>
           <a:bodyPr spcFirstLastPara="1" wrap="square" lIns="91425" tIns="91425" rIns="91425" bIns="91425" anchor="t" anchorCtr="0">
-            <a:normAutofit fontScale="92500" lnSpcReduction="20000"/>
+            <a:normAutofit fontScale="92500" lnSpcReduction="10000"/>
           </a:bodyPr>
           <a:lstStyle/>
           <a:p>
-            <a:pPr marL="0" lvl="0" indent="0" algn="ctr" rtl="0">
+            <a:pPr marL="0" lvl="0" indent="0" algn="l" rtl="0">
               <a:spcBef>
                 <a:spcPts val="0"/>
               </a:spcBef>
@@ -9158,25 +9158,33 @@
               <a:buNone/>
             </a:pPr>
             <a:r>
-              <a:rPr lang="en" sz="2200" b="1" dirty="0"/>
+              <a:rPr lang="en" sz="2400" b="1" dirty="0"/>
               <a:t>    </a:t>
             </a:r>
             <a:r>
-              <a:rPr lang="en" sz="2200" b="1" dirty="0">
+              <a:rPr lang="en" sz="2400" b="1" dirty="0">
                 <a:solidFill>
                   <a:srgbClr val="000000"/>
                 </a:solidFill>
               </a:rPr>
-              <a:t>   TEAM MEMBERS</a:t>
+              <a:t>   TEAM MEMBERS                                   </a:t>
             </a:r>
-            <a:endParaRPr sz="2200" b="1" dirty="0">
+            <a:r>
+              <a:rPr lang="en-US" sz="2400" b="1" dirty="0">
+                <a:solidFill>
+                  <a:schemeClr val="tx1"/>
+                </a:solidFill>
+              </a:rPr>
+              <a:t>Supervised By:  </a:t>
+            </a:r>
+            <a:endParaRPr sz="2400" b="1" dirty="0">
               <a:solidFill>
-                <a:srgbClr val="000000"/>
+                <a:schemeClr val="tx1"/>
               </a:solidFill>
             </a:endParaRPr>
           </a:p>
           <a:p>
-            <a:pPr marL="0" lvl="0" indent="0" algn="ctr" rtl="0">
+            <a:pPr marL="0" lvl="0" indent="0" algn="l" rtl="0">
               <a:spcBef>
                 <a:spcPts val="0"/>
               </a:spcBef>
@@ -9191,7 +9199,7 @@
                   <a:srgbClr val="000000"/>
                 </a:solidFill>
               </a:rPr>
-              <a:t>Inisha Maharjan (THA079BEI012)</a:t>
+              <a:t>Inisha Maharjan (THA079BEI012)                  Er.Saroj Shakya </a:t>
             </a:r>
             <a:endParaRPr sz="2400" dirty="0">
               <a:solidFill>
@@ -9200,7 +9208,7 @@
             </a:endParaRPr>
           </a:p>
           <a:p>
-            <a:pPr marL="0" lvl="0" indent="0" algn="ctr" rtl="0">
+            <a:pPr marL="0" lvl="0" indent="0" algn="l" rtl="0">
               <a:spcBef>
                 <a:spcPts val="0"/>
               </a:spcBef>
@@ -9224,7 +9232,7 @@
             </a:endParaRPr>
           </a:p>
           <a:p>
-            <a:pPr marL="0" lvl="0" indent="0" algn="ctr" rtl="0">
+            <a:pPr marL="0" lvl="0" indent="0" algn="l" rtl="0">
               <a:spcBef>
                 <a:spcPts val="0"/>
               </a:spcBef>
@@ -9248,7 +9256,7 @@
             </a:endParaRPr>
           </a:p>
           <a:p>
-            <a:pPr marL="0" lvl="0" indent="0" algn="ctr" rtl="0">
+            <a:pPr marL="0" lvl="0" indent="0" algn="l" rtl="0">
               <a:spcBef>
                 <a:spcPts val="0"/>
               </a:spcBef>
@@ -9293,7 +9301,7 @@
               <a:buNone/>
             </a:pPr>
             <a:r>
-              <a:rPr lang="en" sz="2000" dirty="0">
+              <a:rPr lang="en" sz="2200" dirty="0">
                 <a:solidFill>
                   <a:srgbClr val="000000"/>
                 </a:solidFill>
@@ -9312,7 +9320,7 @@
               <a:buNone/>
             </a:pPr>
             <a:r>
-              <a:rPr lang="en" sz="2000" dirty="0">
+              <a:rPr lang="en" sz="2200" dirty="0">
                 <a:solidFill>
                   <a:srgbClr val="000000"/>
                 </a:solidFill>
@@ -9330,7 +9338,7 @@
               </a:spcAft>
               <a:buNone/>
             </a:pPr>
-            <a:endParaRPr lang="en" sz="2000" dirty="0">
+            <a:endParaRPr lang="en" sz="2200" dirty="0">
               <a:solidFill>
                 <a:srgbClr val="000000"/>
               </a:solidFill>
@@ -9347,7 +9355,7 @@
               <a:buNone/>
             </a:pPr>
             <a:r>
-              <a:rPr lang="en" sz="2000" dirty="0">
+              <a:rPr lang="en" sz="2200" dirty="0">
                 <a:solidFill>
                   <a:srgbClr val="000000"/>
                 </a:solidFill>

</xml_diff>

<commit_message>
Updated slides for project.
</commit_message>
<xml_diff>
--- a/Sales_Management_Project.pptx
+++ b/Sales_Management_Project.pptx
@@ -10667,10 +10667,10 @@
               <a:buNone/>
             </a:pPr>
             <a:r>
-              <a:rPr lang="en" sz="2400" i="1" dirty="0"/>
+              <a:rPr lang="en" sz="2400" dirty="0"/>
               <a:t>Fig 2: Main Menu Window</a:t>
             </a:r>
-            <a:endParaRPr sz="2400" i="1" dirty="0"/>
+            <a:endParaRPr sz="2400" dirty="0"/>
           </a:p>
         </p:txBody>
       </p:sp>
@@ -11248,7 +11248,7 @@
         </p:nvSpPr>
         <p:spPr>
           <a:xfrm>
-            <a:off x="2353235" y="4233353"/>
+            <a:off x="2339787" y="4398352"/>
             <a:ext cx="4235824" cy="461665"/>
           </a:xfrm>
           <a:prstGeom prst="rect">
@@ -12202,7 +12202,7 @@
         </p:nvSpPr>
         <p:spPr>
           <a:xfrm>
-            <a:off x="1801906" y="4552240"/>
+            <a:off x="1801906" y="4467642"/>
             <a:ext cx="6145307" cy="461665"/>
           </a:xfrm>
           <a:prstGeom prst="rect">
@@ -12757,7 +12757,7 @@
         </p:nvSpPr>
         <p:spPr>
           <a:xfrm>
-            <a:off x="2393575" y="4585447"/>
+            <a:off x="2393575" y="4467642"/>
             <a:ext cx="4894731" cy="461665"/>
           </a:xfrm>
           <a:prstGeom prst="rect">
@@ -13127,7 +13127,7 @@
         </p:nvSpPr>
         <p:spPr>
           <a:xfrm>
-            <a:off x="2050676" y="4663217"/>
+            <a:off x="1960736" y="4528306"/>
             <a:ext cx="5593978" cy="461665"/>
           </a:xfrm>
           <a:prstGeom prst="rect">
@@ -13497,7 +13497,7 @@
         </p:nvSpPr>
         <p:spPr>
           <a:xfrm>
-            <a:off x="2171700" y="4577395"/>
+            <a:off x="2134224" y="4467642"/>
             <a:ext cx="5600699" cy="461665"/>
           </a:xfrm>
           <a:prstGeom prst="rect">
@@ -13682,7 +13682,7 @@
         </p:nvSpPr>
         <p:spPr>
           <a:xfrm>
-            <a:off x="2770094" y="4412125"/>
+            <a:off x="2552736" y="4467642"/>
             <a:ext cx="5022477" cy="461665"/>
           </a:xfrm>
           <a:prstGeom prst="rect">

</xml_diff>